<commit_message>
completed making bertshared fine-tune code
</commit_message>
<xml_diff>
--- a/자연어처리 중간보고서.pptx
+++ b/자연어처리 중간보고서.pptx
@@ -118,7 +118,7 @@
 <file path=ppt/revisionInfo.xml><?xml version="1.0" encoding="utf-8"?>
 <p1510:revInfo xmlns:a="http://schemas.openxmlformats.org/drawingml/2006/main" xmlns:r="http://schemas.openxmlformats.org/officeDocument/2006/relationships" xmlns:p1510="http://schemas.microsoft.com/office/powerpoint/2015/10/main">
   <p1510:revLst>
-    <p1510:client id="{731D3349-E3F6-43CA-86CE-7C2A98F60D00}" v="23" dt="2023-11-21T04:20:27.347"/>
+    <p1510:client id="{731D3349-E3F6-43CA-86CE-7C2A98F60D00}" v="112" dt="2023-11-21T07:55:04.758"/>
   </p1510:revLst>
 </p1510:revInfo>
 </file>
@@ -191,7 +191,7 @@
   <pc:docChgLst>
     <pc:chgData name="성백륜" userId="60898c43-c43d-413b-abba-d12abf6abaab" providerId="ADAL" clId="{731D3349-E3F6-43CA-86CE-7C2A98F60D00}"/>
     <pc:docChg chg="undo custSel modSld">
-      <pc:chgData name="성백륜" userId="60898c43-c43d-413b-abba-d12abf6abaab" providerId="ADAL" clId="{731D3349-E3F6-43CA-86CE-7C2A98F60D00}" dt="2023-11-21T04:20:27.346" v="876" actId="20577"/>
+      <pc:chgData name="성백륜" userId="60898c43-c43d-413b-abba-d12abf6abaab" providerId="ADAL" clId="{731D3349-E3F6-43CA-86CE-7C2A98F60D00}" dt="2023-11-21T07:55:04.758" v="966" actId="20577"/>
       <pc:docMkLst>
         <pc:docMk/>
       </pc:docMkLst>
@@ -211,13 +211,13 @@
         </pc:spChg>
       </pc:sldChg>
       <pc:sldChg chg="modSp mod">
-        <pc:chgData name="성백륜" userId="60898c43-c43d-413b-abba-d12abf6abaab" providerId="ADAL" clId="{731D3349-E3F6-43CA-86CE-7C2A98F60D00}" dt="2023-11-21T04:20:27.346" v="876" actId="20577"/>
+        <pc:chgData name="성백륜" userId="60898c43-c43d-413b-abba-d12abf6abaab" providerId="ADAL" clId="{731D3349-E3F6-43CA-86CE-7C2A98F60D00}" dt="2023-11-21T07:55:04.758" v="966" actId="20577"/>
         <pc:sldMkLst>
           <pc:docMk/>
           <pc:sldMk cId="546830709" sldId="258"/>
         </pc:sldMkLst>
         <pc:spChg chg="mod">
-          <ac:chgData name="성백륜" userId="60898c43-c43d-413b-abba-d12abf6abaab" providerId="ADAL" clId="{731D3349-E3F6-43CA-86CE-7C2A98F60D00}" dt="2023-11-21T04:20:27.346" v="876" actId="20577"/>
+          <ac:chgData name="성백륜" userId="60898c43-c43d-413b-abba-d12abf6abaab" providerId="ADAL" clId="{731D3349-E3F6-43CA-86CE-7C2A98F60D00}" dt="2023-11-21T07:55:04.758" v="966" actId="20577"/>
           <ac:spMkLst>
             <pc:docMk/>
             <pc:sldMk cId="546830709" sldId="258"/>
@@ -4223,7 +4223,7 @@
             <p:spPr/>
             <p:txBody>
               <a:bodyPr>
-                <a:normAutofit fontScale="92500" lnSpcReduction="10000"/>
+                <a:normAutofit fontScale="92500" lnSpcReduction="20000"/>
               </a:bodyPr>
               <a:lstStyle/>
               <a:p>
@@ -4449,7 +4449,7 @@
                 </a:r>
                 <a:r>
                   <a:rPr lang="en-US" altLang="ko-KR" sz="1500" dirty="0"/>
-                  <a:t>. e.g.) </a:t>
+                  <a:t>.e.g.) </a:t>
                 </a:r>
                 <a14:m>
                   <m:oMath xmlns:m="http://schemas.openxmlformats.org/officeDocument/2006/math">
@@ -4463,23 +4463,109 @@
                 </a14:m>
                 <a:r>
                   <a:rPr lang="en-US" altLang="ko-KR" sz="1500" dirty="0"/>
-                  <a:t>(“</a:t>
-                </a:r>
-                <a:r>
-                  <a:rPr lang="ko-KR" altLang="en-US" sz="1500" dirty="0" err="1"/>
-                  <a:t>ㅈ</a:t>
-                </a:r>
+                  <a:t>(</a:t>
+                </a:r>
+                <a14:m>
+                  <m:oMath xmlns:m="http://schemas.openxmlformats.org/officeDocument/2006/math">
+                    <m:sSub>
+                      <m:sSubPr>
+                        <m:ctrlPr>
+                          <a:rPr lang="en-US" altLang="ko-KR" sz="1500" b="0" i="1" dirty="0" smtClean="0">
+                            <a:latin typeface="Cambria Math" panose="02040503050406030204" pitchFamily="18" charset="0"/>
+                          </a:rPr>
+                        </m:ctrlPr>
+                      </m:sSubPr>
+                      <m:e>
+                        <m:r>
+                          <a:rPr lang="en-US" altLang="ko-KR" sz="1500" b="0" i="1" dirty="0" smtClean="0">
+                            <a:latin typeface="Cambria Math" panose="02040503050406030204" pitchFamily="18" charset="0"/>
+                          </a:rPr>
+                          <m:t>𝑋</m:t>
+                        </m:r>
+                      </m:e>
+                      <m:sub>
+                        <m:r>
+                          <a:rPr lang="en-US" altLang="ko-KR" sz="1500" b="0" i="1" dirty="0" smtClean="0">
+                            <a:latin typeface="Cambria Math" panose="02040503050406030204" pitchFamily="18" charset="0"/>
+                          </a:rPr>
+                          <m:t>𝑡𝑟𝑎𝑖𝑛</m:t>
+                        </m:r>
+                      </m:sub>
+                    </m:sSub>
+                    <m:r>
+                      <a:rPr lang="en-US" altLang="ko-KR" sz="1500" b="0" i="1" dirty="0" smtClean="0">
+                        <a:latin typeface="Cambria Math" panose="02040503050406030204" pitchFamily="18" charset="0"/>
+                      </a:rPr>
+                      <m:t>="</m:t>
+                    </m:r>
+                    <m:r>
+                      <a:rPr lang="ko-KR" altLang="en-US" sz="1500" i="1" dirty="0">
+                        <a:latin typeface="Cambria Math" panose="02040503050406030204" pitchFamily="18" charset="0"/>
+                      </a:rPr>
+                      <m:t>ㅈ</m:t>
+                    </m:r>
+                    <m:r>
+                      <a:rPr lang="en-US" altLang="ko-KR" sz="1500" b="0" i="1" dirty="0" smtClean="0">
+                        <a:latin typeface="Cambria Math" panose="02040503050406030204" pitchFamily="18" charset="0"/>
+                      </a:rPr>
+                      <m:t>"</m:t>
+                    </m:r>
+                  </m:oMath>
+                </a14:m>
                 <a:r>
                   <a:rPr lang="en-US" altLang="ko-KR" sz="1500" dirty="0"/>
-                  <a:t>“|”</a:t>
-                </a:r>
-                <a:r>
-                  <a:rPr lang="ko-KR" altLang="en-US" sz="1500" dirty="0" err="1"/>
-                  <a:t>ㅂ</a:t>
-                </a:r>
+                  <a:t>| </a:t>
+                </a:r>
+                <a14:m>
+                  <m:oMath xmlns:m="http://schemas.openxmlformats.org/officeDocument/2006/math">
+                    <m:sSub>
+                      <m:sSubPr>
+                        <m:ctrlPr>
+                          <a:rPr lang="en-US" altLang="ko-KR" sz="1500" i="1" dirty="0">
+                            <a:latin typeface="Cambria Math" panose="02040503050406030204" pitchFamily="18" charset="0"/>
+                          </a:rPr>
+                        </m:ctrlPr>
+                      </m:sSubPr>
+                      <m:e>
+                        <m:r>
+                          <a:rPr lang="en-US" altLang="ko-KR" sz="1500" i="1" dirty="0">
+                            <a:latin typeface="Cambria Math" panose="02040503050406030204" pitchFamily="18" charset="0"/>
+                          </a:rPr>
+                          <m:t>𝑋</m:t>
+                        </m:r>
+                      </m:e>
+                      <m:sub>
+                        <m:r>
+                          <a:rPr lang="en-US" altLang="ko-KR" sz="1500" b="0" i="1" dirty="0" smtClean="0">
+                            <a:latin typeface="Cambria Math" panose="02040503050406030204" pitchFamily="18" charset="0"/>
+                          </a:rPr>
+                          <m:t>𝑟𝑎𝑤</m:t>
+                        </m:r>
+                      </m:sub>
+                    </m:sSub>
+                    <m:r>
+                      <a:rPr lang="en-US" altLang="ko-KR" sz="1500" b="0" i="1" dirty="0" smtClean="0">
+                        <a:latin typeface="Cambria Math" panose="02040503050406030204" pitchFamily="18" charset="0"/>
+                      </a:rPr>
+                      <m:t>="</m:t>
+                    </m:r>
+                    <m:r>
+                      <a:rPr lang="ko-KR" altLang="en-US" sz="1500" i="1" dirty="0">
+                        <a:latin typeface="Cambria Math" panose="02040503050406030204" pitchFamily="18" charset="0"/>
+                      </a:rPr>
+                      <m:t>ㅂ</m:t>
+                    </m:r>
+                    <m:r>
+                      <a:rPr lang="en-US" altLang="ko-KR" sz="1500" b="0" i="1" dirty="0" smtClean="0">
+                        <a:latin typeface="Cambria Math" panose="02040503050406030204" pitchFamily="18" charset="0"/>
+                      </a:rPr>
+                      <m:t>"</m:t>
+                    </m:r>
+                  </m:oMath>
+                </a14:m>
                 <a:r>
                   <a:rPr lang="en-US" altLang="ko-KR" sz="1500" dirty="0"/>
-                  <a:t>”) = 0.05</a:t>
+                  <a:t>) = 0.05</a:t>
                 </a:r>
                 <a:r>
                   <a:rPr lang="ko-KR" altLang="en-US" sz="1500" dirty="0"/>
@@ -4497,7 +4583,46 @@
                 </a14:m>
                 <a:r>
                   <a:rPr lang="en-US" altLang="ko-KR" sz="1500" dirty="0"/>
-                  <a:t>(“</a:t>
+                  <a:t>(</a:t>
+                </a:r>
+                <a14:m>
+                  <m:oMath xmlns:m="http://schemas.openxmlformats.org/officeDocument/2006/math">
+                    <m:sSub>
+                      <m:sSubPr>
+                        <m:ctrlPr>
+                          <a:rPr lang="en-US" altLang="ko-KR" sz="1500" i="1" dirty="0">
+                            <a:latin typeface="Cambria Math" panose="02040503050406030204" pitchFamily="18" charset="0"/>
+                          </a:rPr>
+                        </m:ctrlPr>
+                      </m:sSubPr>
+                      <m:e>
+                        <m:r>
+                          <a:rPr lang="en-US" altLang="ko-KR" sz="1500" i="1" dirty="0">
+                            <a:latin typeface="Cambria Math" panose="02040503050406030204" pitchFamily="18" charset="0"/>
+                          </a:rPr>
+                          <m:t>𝑋</m:t>
+                        </m:r>
+                      </m:e>
+                      <m:sub>
+                        <m:r>
+                          <a:rPr lang="en-US" altLang="ko-KR" sz="1500" i="1" dirty="0">
+                            <a:latin typeface="Cambria Math" panose="02040503050406030204" pitchFamily="18" charset="0"/>
+                          </a:rPr>
+                          <m:t>𝑡𝑟𝑎𝑖𝑛</m:t>
+                        </m:r>
+                      </m:sub>
+                    </m:sSub>
+                    <m:r>
+                      <a:rPr lang="en-US" altLang="ko-KR" sz="1500" b="0" i="1" dirty="0" smtClean="0">
+                        <a:latin typeface="Cambria Math" panose="02040503050406030204" pitchFamily="18" charset="0"/>
+                      </a:rPr>
+                      <m:t>=</m:t>
+                    </m:r>
+                  </m:oMath>
+                </a14:m>
+                <a:r>
+                  <a:rPr lang="en-US" altLang="ko-KR" sz="1500" dirty="0"/>
+                  <a:t>“</a:t>
                 </a:r>
                 <a:r>
                   <a:rPr lang="ko-KR" altLang="en-US" sz="1500" dirty="0" err="1"/>
@@ -4505,7 +4630,46 @@
                 </a:r>
                 <a:r>
                   <a:rPr lang="en-US" altLang="ko-KR" sz="1500" dirty="0"/>
-                  <a:t>”|”</a:t>
+                  <a:t>”|</a:t>
+                </a:r>
+                <a14:m>
+                  <m:oMath xmlns:m="http://schemas.openxmlformats.org/officeDocument/2006/math">
+                    <m:sSub>
+                      <m:sSubPr>
+                        <m:ctrlPr>
+                          <a:rPr lang="en-US" altLang="ko-KR" sz="1500" i="1" dirty="0">
+                            <a:latin typeface="Cambria Math" panose="02040503050406030204" pitchFamily="18" charset="0"/>
+                          </a:rPr>
+                        </m:ctrlPr>
+                      </m:sSubPr>
+                      <m:e>
+                        <m:r>
+                          <a:rPr lang="en-US" altLang="ko-KR" sz="1500" i="1" dirty="0">
+                            <a:latin typeface="Cambria Math" panose="02040503050406030204" pitchFamily="18" charset="0"/>
+                          </a:rPr>
+                          <m:t>𝑋</m:t>
+                        </m:r>
+                      </m:e>
+                      <m:sub>
+                        <m:r>
+                          <a:rPr lang="en-US" altLang="ko-KR" sz="1500" i="1" dirty="0">
+                            <a:latin typeface="Cambria Math" panose="02040503050406030204" pitchFamily="18" charset="0"/>
+                          </a:rPr>
+                          <m:t>𝑟𝑎𝑤</m:t>
+                        </m:r>
+                      </m:sub>
+                    </m:sSub>
+                    <m:r>
+                      <a:rPr lang="en-US" altLang="ko-KR" sz="1500" i="1" dirty="0">
+                        <a:latin typeface="Cambria Math" panose="02040503050406030204" pitchFamily="18" charset="0"/>
+                      </a:rPr>
+                      <m:t>=</m:t>
+                    </m:r>
+                  </m:oMath>
+                </a14:m>
+                <a:r>
+                  <a:rPr lang="en-US" altLang="ko-KR" sz="1500" dirty="0"/>
+                  <a:t>”</a:t>
                 </a:r>
                 <a:r>
                   <a:rPr lang="ko-KR" altLang="en-US" sz="1500" dirty="0"/>
@@ -4636,7 +4800,7 @@
               <a:blipFill>
                 <a:blip r:embed="rId2"/>
                 <a:stretch>
-                  <a:fillRect l="-754" t="-2381"/>
+                  <a:fillRect l="-754" t="-3081"/>
                 </a:stretch>
               </a:blipFill>
             </p:spPr>

</xml_diff>